<commit_message>
@Todd: # why fertility rate for hispanic and others race were identical ? # why engine is not running?
</commit_message>
<xml_diff>
--- a/applications/SHIELD/support/code_structure.pptx
+++ b/applications/SHIELD/support/code_structure.pptx
@@ -107,6 +107,11 @@
       </a:defRPr>
     </a:lvl9pPr>
   </p:defaultTextStyle>
+  <p:extLst>
+    <p:ext uri="{EFAFB233-063F-42B5-8137-9DF3F51BA10A}">
+      <p15:sldGuideLst xmlns:p15="http://schemas.microsoft.com/office/powerpoint/2012/main"/>
+    </p:ext>
+  </p:extLst>
 </p:presentation>
 </file>
 
@@ -114,6 +119,99 @@
 <p188:authorLst xmlns:a="http://schemas.openxmlformats.org/drawingml/2006/main" xmlns:r="http://schemas.openxmlformats.org/officeDocument/2006/relationships" xmlns:p188="http://schemas.microsoft.com/office/powerpoint/2018/8/main">
   <p188:author id="{56734C17-37B4-8A71-E7CB-18462DA1BAAD}" name="Parastu Kasaie" initials="PK" userId="S::pkasaie1@jh.edu::1e6f2ad9-07d6-4e69-b2cb-e8eac35e5cb9" providerId="AD"/>
 </p188:authorLst>
+</file>
+
+<file path=ppt/changesInfos/changesInfo1.xml><?xml version="1.0" encoding="utf-8"?>
+<pc:chgInfo xmlns:a="http://schemas.openxmlformats.org/drawingml/2006/main" xmlns:r="http://schemas.openxmlformats.org/officeDocument/2006/relationships" xmlns:ac="http://schemas.microsoft.com/office/drawing/2013/main/command" xmlns:pc="http://schemas.microsoft.com/office/powerpoint/2013/main/command">
+  <pc:docChgLst>
+    <pc:chgData name="Parastu Kasaie" userId="1e6f2ad9-07d6-4e69-b2cb-e8eac35e5cb9" providerId="ADAL" clId="{291C9C49-1CD1-AA4D-B421-3BA0CCF5F717}"/>
+    <pc:docChg chg="undo custSel modSld">
+      <pc:chgData name="Parastu Kasaie" userId="1e6f2ad9-07d6-4e69-b2cb-e8eac35e5cb9" providerId="ADAL" clId="{291C9C49-1CD1-AA4D-B421-3BA0CCF5F717}" dt="2024-09-30T18:46:23.716" v="89"/>
+      <pc:docMkLst>
+        <pc:docMk/>
+      </pc:docMkLst>
+      <pc:sldChg chg="addSp delSp modSp mod">
+        <pc:chgData name="Parastu Kasaie" userId="1e6f2ad9-07d6-4e69-b2cb-e8eac35e5cb9" providerId="ADAL" clId="{291C9C49-1CD1-AA4D-B421-3BA0CCF5F717}" dt="2024-09-30T18:46:23.716" v="89"/>
+        <pc:sldMkLst>
+          <pc:docMk/>
+          <pc:sldMk cId="2862725997" sldId="256"/>
+        </pc:sldMkLst>
+        <pc:spChg chg="add del mod">
+          <ac:chgData name="Parastu Kasaie" userId="1e6f2ad9-07d6-4e69-b2cb-e8eac35e5cb9" providerId="ADAL" clId="{291C9C49-1CD1-AA4D-B421-3BA0CCF5F717}" dt="2024-09-30T18:46:23.716" v="89"/>
+          <ac:spMkLst>
+            <pc:docMk/>
+            <pc:sldMk cId="2862725997" sldId="256"/>
+            <ac:spMk id="2" creationId="{35205876-8424-DF5C-178E-73EAFF00EA27}"/>
+          </ac:spMkLst>
+        </pc:spChg>
+        <pc:spChg chg="add mod">
+          <ac:chgData name="Parastu Kasaie" userId="1e6f2ad9-07d6-4e69-b2cb-e8eac35e5cb9" providerId="ADAL" clId="{291C9C49-1CD1-AA4D-B421-3BA0CCF5F717}" dt="2024-09-30T18:45:57.100" v="46" actId="1076"/>
+          <ac:spMkLst>
+            <pc:docMk/>
+            <pc:sldMk cId="2862725997" sldId="256"/>
+            <ac:spMk id="3" creationId="{00D44B15-B0E7-CFAA-E3D5-6AA8DE467941}"/>
+          </ac:spMkLst>
+        </pc:spChg>
+        <pc:spChg chg="add mod">
+          <ac:chgData name="Parastu Kasaie" userId="1e6f2ad9-07d6-4e69-b2cb-e8eac35e5cb9" providerId="ADAL" clId="{291C9C49-1CD1-AA4D-B421-3BA0CCF5F717}" dt="2024-09-30T18:46:13.450" v="58" actId="1076"/>
+          <ac:spMkLst>
+            <pc:docMk/>
+            <pc:sldMk cId="2862725997" sldId="256"/>
+            <ac:spMk id="8" creationId="{5A1FF2AF-6A91-2ED1-1154-E69FA600B269}"/>
+          </ac:spMkLst>
+        </pc:spChg>
+        <pc:spChg chg="add mod">
+          <ac:chgData name="Parastu Kasaie" userId="1e6f2ad9-07d6-4e69-b2cb-e8eac35e5cb9" providerId="ADAL" clId="{291C9C49-1CD1-AA4D-B421-3BA0CCF5F717}" dt="2024-09-30T18:46:19.851" v="87" actId="20577"/>
+          <ac:spMkLst>
+            <pc:docMk/>
+            <pc:sldMk cId="2862725997" sldId="256"/>
+            <ac:spMk id="11" creationId="{2E954EE3-FBC1-E881-5C1D-35D1EFC86C78}"/>
+          </ac:spMkLst>
+        </pc:spChg>
+        <pc:spChg chg="mod">
+          <ac:chgData name="Parastu Kasaie" userId="1e6f2ad9-07d6-4e69-b2cb-e8eac35e5cb9" providerId="ADAL" clId="{291C9C49-1CD1-AA4D-B421-3BA0CCF5F717}" dt="2024-09-30T18:46:04.259" v="55" actId="1035"/>
+          <ac:spMkLst>
+            <pc:docMk/>
+            <pc:sldMk cId="2862725997" sldId="256"/>
+            <ac:spMk id="44" creationId="{90183F1A-77A2-469A-3CEB-A6E41D9AA503}"/>
+          </ac:spMkLst>
+        </pc:spChg>
+        <pc:spChg chg="mod">
+          <ac:chgData name="Parastu Kasaie" userId="1e6f2ad9-07d6-4e69-b2cb-e8eac35e5cb9" providerId="ADAL" clId="{291C9C49-1CD1-AA4D-B421-3BA0CCF5F717}" dt="2024-09-30T18:46:04.259" v="55" actId="1035"/>
+          <ac:spMkLst>
+            <pc:docMk/>
+            <pc:sldMk cId="2862725997" sldId="256"/>
+            <ac:spMk id="45" creationId="{4B4E8057-DCDA-F26B-53A2-D1CD5697336F}"/>
+          </ac:spMkLst>
+        </pc:spChg>
+        <pc:grpChg chg="mod">
+          <ac:chgData name="Parastu Kasaie" userId="1e6f2ad9-07d6-4e69-b2cb-e8eac35e5cb9" providerId="ADAL" clId="{291C9C49-1CD1-AA4D-B421-3BA0CCF5F717}" dt="2024-09-30T18:46:04.259" v="55" actId="1035"/>
+          <ac:grpSpMkLst>
+            <pc:docMk/>
+            <pc:sldMk cId="2862725997" sldId="256"/>
+            <ac:grpSpMk id="51" creationId="{E5545B7C-84AF-8C83-2853-21F5E7D2B15B}"/>
+          </ac:grpSpMkLst>
+        </pc:grpChg>
+        <pc:cxnChg chg="mod">
+          <ac:chgData name="Parastu Kasaie" userId="1e6f2ad9-07d6-4e69-b2cb-e8eac35e5cb9" providerId="ADAL" clId="{291C9C49-1CD1-AA4D-B421-3BA0CCF5F717}" dt="2024-09-30T18:46:04.259" v="55" actId="1035"/>
+          <ac:cxnSpMkLst>
+            <pc:docMk/>
+            <pc:sldMk cId="2862725997" sldId="256"/>
+            <ac:cxnSpMk id="17" creationId="{0CD5318D-BA95-98C0-F3A2-FB078DE90551}"/>
+          </ac:cxnSpMkLst>
+        </pc:cxnChg>
+        <pc:cxnChg chg="mod">
+          <ac:chgData name="Parastu Kasaie" userId="1e6f2ad9-07d6-4e69-b2cb-e8eac35e5cb9" providerId="ADAL" clId="{291C9C49-1CD1-AA4D-B421-3BA0CCF5F717}" dt="2024-09-30T18:46:04.259" v="55" actId="1035"/>
+          <ac:cxnSpMkLst>
+            <pc:docMk/>
+            <pc:sldMk cId="2862725997" sldId="256"/>
+            <ac:cxnSpMk id="46" creationId="{00AC34CA-BA4A-8FF1-6C8A-111A696A4928}"/>
+          </ac:cxnSpMkLst>
+        </pc:cxnChg>
+      </pc:sldChg>
+    </pc:docChg>
+  </pc:docChgLst>
+</pc:chgInfo>
 </file>
 
 <file path=ppt/notesMasters/notesMaster1.xml><?xml version="1.0" encoding="utf-8"?>
@@ -198,7 +296,7 @@
           <a:p>
             <a:fld id="{AF550CE8-CB32-944E-81A2-355894EB1850}" type="datetimeFigureOut">
               <a:rPr lang="en-US" smtClean="0"/>
-              <a:t>9/10/24</a:t>
+              <a:t>9/30/24</a:t>
             </a:fld>
             <a:endParaRPr lang="en-US"/>
           </a:p>
@@ -702,7 +800,7 @@
           <a:p>
             <a:fld id="{87C942E3-5AD8-C541-9C7F-5AB34880FA78}" type="datetimeFigureOut">
               <a:rPr lang="en-US" smtClean="0"/>
-              <a:t>9/10/24</a:t>
+              <a:t>9/30/24</a:t>
             </a:fld>
             <a:endParaRPr lang="en-US"/>
           </a:p>
@@ -900,7 +998,7 @@
           <a:p>
             <a:fld id="{87C942E3-5AD8-C541-9C7F-5AB34880FA78}" type="datetimeFigureOut">
               <a:rPr lang="en-US" smtClean="0"/>
-              <a:t>9/10/24</a:t>
+              <a:t>9/30/24</a:t>
             </a:fld>
             <a:endParaRPr lang="en-US"/>
           </a:p>
@@ -1108,7 +1206,7 @@
           <a:p>
             <a:fld id="{87C942E3-5AD8-C541-9C7F-5AB34880FA78}" type="datetimeFigureOut">
               <a:rPr lang="en-US" smtClean="0"/>
-              <a:t>9/10/24</a:t>
+              <a:t>9/30/24</a:t>
             </a:fld>
             <a:endParaRPr lang="en-US"/>
           </a:p>
@@ -1306,7 +1404,7 @@
           <a:p>
             <a:fld id="{87C942E3-5AD8-C541-9C7F-5AB34880FA78}" type="datetimeFigureOut">
               <a:rPr lang="en-US" smtClean="0"/>
-              <a:t>9/10/24</a:t>
+              <a:t>9/30/24</a:t>
             </a:fld>
             <a:endParaRPr lang="en-US"/>
           </a:p>
@@ -1581,7 +1679,7 @@
           <a:p>
             <a:fld id="{87C942E3-5AD8-C541-9C7F-5AB34880FA78}" type="datetimeFigureOut">
               <a:rPr lang="en-US" smtClean="0"/>
-              <a:t>9/10/24</a:t>
+              <a:t>9/30/24</a:t>
             </a:fld>
             <a:endParaRPr lang="en-US"/>
           </a:p>
@@ -1846,7 +1944,7 @@
           <a:p>
             <a:fld id="{87C942E3-5AD8-C541-9C7F-5AB34880FA78}" type="datetimeFigureOut">
               <a:rPr lang="en-US" smtClean="0"/>
-              <a:t>9/10/24</a:t>
+              <a:t>9/30/24</a:t>
             </a:fld>
             <a:endParaRPr lang="en-US"/>
           </a:p>
@@ -2258,7 +2356,7 @@
           <a:p>
             <a:fld id="{87C942E3-5AD8-C541-9C7F-5AB34880FA78}" type="datetimeFigureOut">
               <a:rPr lang="en-US" smtClean="0"/>
-              <a:t>9/10/24</a:t>
+              <a:t>9/30/24</a:t>
             </a:fld>
             <a:endParaRPr lang="en-US"/>
           </a:p>
@@ -2399,7 +2497,7 @@
           <a:p>
             <a:fld id="{87C942E3-5AD8-C541-9C7F-5AB34880FA78}" type="datetimeFigureOut">
               <a:rPr lang="en-US" smtClean="0"/>
-              <a:t>9/10/24</a:t>
+              <a:t>9/30/24</a:t>
             </a:fld>
             <a:endParaRPr lang="en-US"/>
           </a:p>
@@ -2512,7 +2610,7 @@
           <a:p>
             <a:fld id="{87C942E3-5AD8-C541-9C7F-5AB34880FA78}" type="datetimeFigureOut">
               <a:rPr lang="en-US" smtClean="0"/>
-              <a:t>9/10/24</a:t>
+              <a:t>9/30/24</a:t>
             </a:fld>
             <a:endParaRPr lang="en-US"/>
           </a:p>
@@ -2823,7 +2921,7 @@
           <a:p>
             <a:fld id="{87C942E3-5AD8-C541-9C7F-5AB34880FA78}" type="datetimeFigureOut">
               <a:rPr lang="en-US" smtClean="0"/>
-              <a:t>9/10/24</a:t>
+              <a:t>9/30/24</a:t>
             </a:fld>
             <a:endParaRPr lang="en-US"/>
           </a:p>
@@ -3111,7 +3209,7 @@
           <a:p>
             <a:fld id="{87C942E3-5AD8-C541-9C7F-5AB34880FA78}" type="datetimeFigureOut">
               <a:rPr lang="en-US" smtClean="0"/>
-              <a:t>9/10/24</a:t>
+              <a:t>9/30/24</a:t>
             </a:fld>
             <a:endParaRPr lang="en-US"/>
           </a:p>
@@ -3352,7 +3450,7 @@
           <a:p>
             <a:fld id="{87C942E3-5AD8-C541-9C7F-5AB34880FA78}" type="datetimeFigureOut">
               <a:rPr lang="en-US" smtClean="0"/>
-              <a:t>9/10/24</a:t>
+              <a:t>9/30/24</a:t>
             </a:fld>
             <a:endParaRPr lang="en-US"/>
           </a:p>
@@ -4198,7 +4296,7 @@
         <p:spPr>
           <a:xfrm>
             <a:off x="4596002" y="587561"/>
-            <a:ext cx="2912197" cy="2867271"/>
+            <a:ext cx="2912197" cy="2562471"/>
           </a:xfrm>
           <a:prstGeom prst="line">
             <a:avLst/>
@@ -4233,7 +4331,7 @@
         </p:nvGrpSpPr>
         <p:grpSpPr>
           <a:xfrm>
-            <a:off x="7508199" y="2479818"/>
+            <a:off x="7508199" y="2175018"/>
             <a:ext cx="6096001" cy="1988669"/>
             <a:chOff x="6212799" y="2453986"/>
             <a:chExt cx="6096001" cy="1988669"/>
@@ -4691,7 +4789,7 @@
         </p:nvSpPr>
         <p:spPr>
           <a:xfrm>
-            <a:off x="5521766" y="4432562"/>
+            <a:off x="5521766" y="4127762"/>
             <a:ext cx="1556658" cy="751114"/>
           </a:xfrm>
           <a:prstGeom prst="roundRect">
@@ -4744,7 +4842,7 @@
         </p:nvSpPr>
         <p:spPr>
           <a:xfrm>
-            <a:off x="7248571" y="4660724"/>
+            <a:off x="7248571" y="4355924"/>
             <a:ext cx="5825184" cy="369332"/>
           </a:xfrm>
           <a:prstGeom prst="rect">
@@ -4784,7 +4882,7 @@
         <p:spPr>
           <a:xfrm>
             <a:off x="4596002" y="587561"/>
-            <a:ext cx="925764" cy="4220558"/>
+            <a:ext cx="925764" cy="3915758"/>
           </a:xfrm>
           <a:prstGeom prst="line">
             <a:avLst/>
@@ -4805,6 +4903,153 @@
           </a:fontRef>
         </p:style>
       </p:cxnSp>
+      <p:sp>
+        <p:nvSpPr>
+          <p:cNvPr id="3" name="Rounded Rectangle 2">
+            <a:extLst>
+              <a:ext uri="{FF2B5EF4-FFF2-40B4-BE49-F238E27FC236}">
+                <a16:creationId xmlns:a16="http://schemas.microsoft.com/office/drawing/2014/main" id="{00D44B15-B0E7-CFAA-E3D5-6AA8DE467941}"/>
+              </a:ext>
+            </a:extLst>
+          </p:cNvPr>
+          <p:cNvSpPr/>
+          <p:nvPr/>
+        </p:nvSpPr>
+        <p:spPr>
+          <a:xfrm>
+            <a:off x="3179564" y="5340317"/>
+            <a:ext cx="1556658" cy="751114"/>
+          </a:xfrm>
+          <a:prstGeom prst="roundRect">
+            <a:avLst/>
+          </a:prstGeom>
+        </p:spPr>
+        <p:style>
+          <a:lnRef idx="2">
+            <a:schemeClr val="accent1">
+              <a:shade val="15000"/>
+            </a:schemeClr>
+          </a:lnRef>
+          <a:fillRef idx="1">
+            <a:schemeClr val="accent1"/>
+          </a:fillRef>
+          <a:effectRef idx="0">
+            <a:schemeClr val="accent1"/>
+          </a:effectRef>
+          <a:fontRef idx="minor">
+            <a:schemeClr val="lt1"/>
+          </a:fontRef>
+        </p:style>
+        <p:txBody>
+          <a:bodyPr rtlCol="0" anchor="ctr"/>
+          <a:lstStyle/>
+          <a:p>
+            <a:pPr algn="ctr"/>
+            <a:r>
+              <a:rPr lang="en-US" dirty="0"/>
+              <a:t>Likelihoods</a:t>
+            </a:r>
+          </a:p>
+        </p:txBody>
+      </p:sp>
+      <p:sp>
+        <p:nvSpPr>
+          <p:cNvPr id="8" name="Rounded Rectangle 7">
+            <a:extLst>
+              <a:ext uri="{FF2B5EF4-FFF2-40B4-BE49-F238E27FC236}">
+                <a16:creationId xmlns:a16="http://schemas.microsoft.com/office/drawing/2014/main" id="{5A1FF2AF-6A91-2ED1-1154-E69FA600B269}"/>
+              </a:ext>
+            </a:extLst>
+          </p:cNvPr>
+          <p:cNvSpPr/>
+          <p:nvPr/>
+        </p:nvSpPr>
+        <p:spPr>
+          <a:xfrm>
+            <a:off x="3179564" y="6436497"/>
+            <a:ext cx="3367256" cy="751114"/>
+          </a:xfrm>
+          <a:prstGeom prst="roundRect">
+            <a:avLst/>
+          </a:prstGeom>
+        </p:spPr>
+        <p:style>
+          <a:lnRef idx="2">
+            <a:schemeClr val="accent1">
+              <a:shade val="15000"/>
+            </a:schemeClr>
+          </a:lnRef>
+          <a:fillRef idx="1">
+            <a:schemeClr val="accent1"/>
+          </a:fillRef>
+          <a:effectRef idx="0">
+            <a:schemeClr val="accent1"/>
+          </a:effectRef>
+          <a:fontRef idx="minor">
+            <a:schemeClr val="lt1"/>
+          </a:fontRef>
+        </p:style>
+        <p:txBody>
+          <a:bodyPr rtlCol="0" anchor="ctr"/>
+          <a:lstStyle/>
+          <a:p>
+            <a:pPr algn="ctr"/>
+            <a:r>
+              <a:rPr lang="en-US" dirty="0"/>
+              <a:t>Register calibration </a:t>
+            </a:r>
+          </a:p>
+        </p:txBody>
+      </p:sp>
+      <p:sp>
+        <p:nvSpPr>
+          <p:cNvPr id="11" name="Rounded Rectangle 10">
+            <a:extLst>
+              <a:ext uri="{FF2B5EF4-FFF2-40B4-BE49-F238E27FC236}">
+                <a16:creationId xmlns:a16="http://schemas.microsoft.com/office/drawing/2014/main" id="{2E954EE3-FBC1-E881-5C1D-35D1EFC86C78}"/>
+              </a:ext>
+            </a:extLst>
+          </p:cNvPr>
+          <p:cNvSpPr/>
+          <p:nvPr/>
+        </p:nvSpPr>
+        <p:spPr>
+          <a:xfrm>
+            <a:off x="3179564" y="7258259"/>
+            <a:ext cx="1556658" cy="751114"/>
+          </a:xfrm>
+          <a:prstGeom prst="roundRect">
+            <a:avLst/>
+          </a:prstGeom>
+        </p:spPr>
+        <p:style>
+          <a:lnRef idx="2">
+            <a:schemeClr val="accent1">
+              <a:shade val="15000"/>
+            </a:schemeClr>
+          </a:lnRef>
+          <a:fillRef idx="1">
+            <a:schemeClr val="accent1"/>
+          </a:fillRef>
+          <a:effectRef idx="0">
+            <a:schemeClr val="accent1"/>
+          </a:effectRef>
+          <a:fontRef idx="minor">
+            <a:schemeClr val="lt1"/>
+          </a:fontRef>
+        </p:style>
+        <p:txBody>
+          <a:bodyPr rtlCol="0" anchor="ctr"/>
+          <a:lstStyle/>
+          <a:p>
+            <a:pPr algn="ctr"/>
+            <a:r>
+              <a:rPr lang="en-US" dirty="0"/>
+              <a:t>Register and run calibration</a:t>
+            </a:r>
+          </a:p>
+        </p:txBody>
+      </p:sp>
     </p:spTree>
     <p:extLst>
       <p:ext uri="{BB962C8B-B14F-4D97-AF65-F5344CB8AC3E}">

</xml_diff>